<commit_message>
H1919 total call count 5299
</commit_message>
<xml_diff>
--- a/presentations/H1919 Battleship.pptx
+++ b/presentations/H1919 Battleship.pptx
@@ -10,8 +10,8 @@
     <p:sldId id="258" r:id="rId4"/>
     <p:sldId id="259" r:id="rId5"/>
     <p:sldId id="260" r:id="rId6"/>
-    <p:sldId id="261" r:id="rId7"/>
-    <p:sldId id="262" r:id="rId8"/>
+    <p:sldId id="262" r:id="rId7"/>
+    <p:sldId id="261" r:id="rId8"/>
   </p:sldIdLst>
   <p:sldSz cx="12192000" cy="6858000"/>
   <p:notesSz cx="6858000" cy="9144000"/>
@@ -276,7 +276,7 @@
           <a:p>
             <a:fld id="{F87B872E-510C-43F0-B703-9859B42EA005}" type="datetimeFigureOut">
               <a:rPr lang="ko-KR" altLang="en-US" smtClean="0"/>
-              <a:t>2020-05-24</a:t>
+              <a:t>2020-05-26</a:t>
             </a:fld>
             <a:endParaRPr lang="ko-KR" altLang="en-US"/>
           </a:p>
@@ -474,7 +474,7 @@
           <a:p>
             <a:fld id="{F87B872E-510C-43F0-B703-9859B42EA005}" type="datetimeFigureOut">
               <a:rPr lang="ko-KR" altLang="en-US" smtClean="0"/>
-              <a:t>2020-05-24</a:t>
+              <a:t>2020-05-26</a:t>
             </a:fld>
             <a:endParaRPr lang="ko-KR" altLang="en-US"/>
           </a:p>
@@ -682,7 +682,7 @@
           <a:p>
             <a:fld id="{F87B872E-510C-43F0-B703-9859B42EA005}" type="datetimeFigureOut">
               <a:rPr lang="ko-KR" altLang="en-US" smtClean="0"/>
-              <a:t>2020-05-24</a:t>
+              <a:t>2020-05-26</a:t>
             </a:fld>
             <a:endParaRPr lang="ko-KR" altLang="en-US"/>
           </a:p>
@@ -880,7 +880,7 @@
           <a:p>
             <a:fld id="{F87B872E-510C-43F0-B703-9859B42EA005}" type="datetimeFigureOut">
               <a:rPr lang="ko-KR" altLang="en-US" smtClean="0"/>
-              <a:t>2020-05-24</a:t>
+              <a:t>2020-05-26</a:t>
             </a:fld>
             <a:endParaRPr lang="ko-KR" altLang="en-US"/>
           </a:p>
@@ -1155,7 +1155,7 @@
           <a:p>
             <a:fld id="{F87B872E-510C-43F0-B703-9859B42EA005}" type="datetimeFigureOut">
               <a:rPr lang="ko-KR" altLang="en-US" smtClean="0"/>
-              <a:t>2020-05-24</a:t>
+              <a:t>2020-05-26</a:t>
             </a:fld>
             <a:endParaRPr lang="ko-KR" altLang="en-US"/>
           </a:p>
@@ -1420,7 +1420,7 @@
           <a:p>
             <a:fld id="{F87B872E-510C-43F0-B703-9859B42EA005}" type="datetimeFigureOut">
               <a:rPr lang="ko-KR" altLang="en-US" smtClean="0"/>
-              <a:t>2020-05-24</a:t>
+              <a:t>2020-05-26</a:t>
             </a:fld>
             <a:endParaRPr lang="ko-KR" altLang="en-US"/>
           </a:p>
@@ -1832,7 +1832,7 @@
           <a:p>
             <a:fld id="{F87B872E-510C-43F0-B703-9859B42EA005}" type="datetimeFigureOut">
               <a:rPr lang="ko-KR" altLang="en-US" smtClean="0"/>
-              <a:t>2020-05-24</a:t>
+              <a:t>2020-05-26</a:t>
             </a:fld>
             <a:endParaRPr lang="ko-KR" altLang="en-US"/>
           </a:p>
@@ -1973,7 +1973,7 @@
           <a:p>
             <a:fld id="{F87B872E-510C-43F0-B703-9859B42EA005}" type="datetimeFigureOut">
               <a:rPr lang="ko-KR" altLang="en-US" smtClean="0"/>
-              <a:t>2020-05-24</a:t>
+              <a:t>2020-05-26</a:t>
             </a:fld>
             <a:endParaRPr lang="ko-KR" altLang="en-US"/>
           </a:p>
@@ -2086,7 +2086,7 @@
           <a:p>
             <a:fld id="{F87B872E-510C-43F0-B703-9859B42EA005}" type="datetimeFigureOut">
               <a:rPr lang="ko-KR" altLang="en-US" smtClean="0"/>
-              <a:t>2020-05-24</a:t>
+              <a:t>2020-05-26</a:t>
             </a:fld>
             <a:endParaRPr lang="ko-KR" altLang="en-US"/>
           </a:p>
@@ -2397,7 +2397,7 @@
           <a:p>
             <a:fld id="{F87B872E-510C-43F0-B703-9859B42EA005}" type="datetimeFigureOut">
               <a:rPr lang="ko-KR" altLang="en-US" smtClean="0"/>
-              <a:t>2020-05-24</a:t>
+              <a:t>2020-05-26</a:t>
             </a:fld>
             <a:endParaRPr lang="ko-KR" altLang="en-US"/>
           </a:p>
@@ -2685,7 +2685,7 @@
           <a:p>
             <a:fld id="{F87B872E-510C-43F0-B703-9859B42EA005}" type="datetimeFigureOut">
               <a:rPr lang="ko-KR" altLang="en-US" smtClean="0"/>
-              <a:t>2020-05-24</a:t>
+              <a:t>2020-05-26</a:t>
             </a:fld>
             <a:endParaRPr lang="ko-KR" altLang="en-US"/>
           </a:p>
@@ -2926,7 +2926,7 @@
           <a:p>
             <a:fld id="{F87B872E-510C-43F0-B703-9859B42EA005}" type="datetimeFigureOut">
               <a:rPr lang="ko-KR" altLang="en-US" smtClean="0"/>
-              <a:t>2020-05-24</a:t>
+              <a:t>2020-05-26</a:t>
             </a:fld>
             <a:endParaRPr lang="ko-KR" altLang="en-US"/>
           </a:p>
@@ -8012,7 +8012,7 @@
             <p:spPr/>
             <p:txBody>
               <a:bodyPr>
-                <a:normAutofit fontScale="62500" lnSpcReduction="20000"/>
+                <a:normAutofit/>
               </a:bodyPr>
               <a:lstStyle/>
               <a:p>
@@ -8059,120 +8059,6 @@
                 </a14:m>
                 <a:endParaRPr lang="en-US" altLang="ko-KR" dirty="0"/>
               </a:p>
-              <a:p>
-                <a:r>
-                  <a:rPr lang="ko-KR" altLang="en-US" dirty="0"/>
-                  <a:t>실제 결과</a:t>
-                </a:r>
-                <a:endParaRPr lang="en-US" altLang="ko-KR" dirty="0"/>
-              </a:p>
-              <a:p>
-                <a:pPr marL="0" indent="0">
-                  <a:buNone/>
-                </a:pPr>
-                <a:r>
-                  <a:rPr lang="en-US" altLang="ko-KR" dirty="0"/>
-                  <a:t>#1 100 642</a:t>
-                </a:r>
-              </a:p>
-              <a:p>
-                <a:pPr marL="0" indent="0">
-                  <a:buNone/>
-                </a:pPr>
-                <a:r>
-                  <a:rPr lang="en-US" altLang="ko-KR" dirty="0"/>
-                  <a:t>#2 100 650</a:t>
-                </a:r>
-              </a:p>
-              <a:p>
-                <a:pPr marL="0" indent="0">
-                  <a:buNone/>
-                </a:pPr>
-                <a:r>
-                  <a:rPr lang="en-US" altLang="ko-KR" dirty="0"/>
-                  <a:t>#3 100 650</a:t>
-                </a:r>
-              </a:p>
-              <a:p>
-                <a:pPr marL="0" indent="0">
-                  <a:buNone/>
-                </a:pPr>
-                <a:r>
-                  <a:rPr lang="en-US" altLang="ko-KR" dirty="0"/>
-                  <a:t>#4 100 656</a:t>
-                </a:r>
-              </a:p>
-              <a:p>
-                <a:pPr marL="0" indent="0">
-                  <a:buNone/>
-                </a:pPr>
-                <a:r>
-                  <a:rPr lang="en-US" altLang="ko-KR" dirty="0"/>
-                  <a:t>#5 100 661</a:t>
-                </a:r>
-              </a:p>
-              <a:p>
-                <a:pPr marL="0" indent="0">
-                  <a:buNone/>
-                </a:pPr>
-                <a:r>
-                  <a:rPr lang="en-US" altLang="ko-KR" dirty="0"/>
-                  <a:t>#6 100 644</a:t>
-                </a:r>
-              </a:p>
-              <a:p>
-                <a:pPr marL="0" indent="0">
-                  <a:buNone/>
-                </a:pPr>
-                <a:r>
-                  <a:rPr lang="en-US" altLang="ko-KR" dirty="0"/>
-                  <a:t>#7 100 652</a:t>
-                </a:r>
-              </a:p>
-              <a:p>
-                <a:pPr marL="0" indent="0">
-                  <a:buNone/>
-                </a:pPr>
-                <a:r>
-                  <a:rPr lang="en-US" altLang="ko-KR" dirty="0"/>
-                  <a:t>#8 100 645</a:t>
-                </a:r>
-              </a:p>
-              <a:p>
-                <a:pPr marL="0" indent="0">
-                  <a:buNone/>
-                </a:pPr>
-                <a:r>
-                  <a:rPr lang="en-US" altLang="ko-KR" dirty="0"/>
-                  <a:t>#9 100 650</a:t>
-                </a:r>
-              </a:p>
-              <a:p>
-                <a:pPr marL="0" indent="0">
-                  <a:buNone/>
-                </a:pPr>
-                <a:r>
-                  <a:rPr lang="en-US" altLang="ko-KR" dirty="0"/>
-                  <a:t>#10 100 649</a:t>
-                </a:r>
-              </a:p>
-              <a:p>
-                <a:pPr marL="0" indent="0">
-                  <a:buNone/>
-                </a:pPr>
-                <a:r>
-                  <a:rPr lang="en-US" altLang="ko-KR" dirty="0"/>
-                  <a:t>total score = 100, total </a:t>
-                </a:r>
-                <a:r>
-                  <a:rPr lang="en-US" altLang="ko-KR" dirty="0" err="1"/>
-                  <a:t>callcount</a:t>
-                </a:r>
-                <a:r>
-                  <a:rPr lang="en-US" altLang="ko-KR" dirty="0"/>
-                  <a:t> = 6499</a:t>
-                </a:r>
-              </a:p>
             </p:txBody>
           </p:sp>
         </mc:Choice>
@@ -8197,7 +8083,7 @@
               <a:blipFill>
                 <a:blip r:embed="rId2"/>
                 <a:stretch>
-                  <a:fillRect l="-522" t="-2521"/>
+                  <a:fillRect l="-1043" t="-2381"/>
                 </a:stretch>
               </a:blipFill>
             </p:spPr>
@@ -8251,95 +8137,6 @@
           <p:cNvPr id="2" name="제목 1">
             <a:extLst>
               <a:ext uri="{FF2B5EF4-FFF2-40B4-BE49-F238E27FC236}">
-                <a16:creationId xmlns:a16="http://schemas.microsoft.com/office/drawing/2014/main" id="{6F81C93D-6C08-4117-94AC-4DFEFA943011}"/>
-              </a:ext>
-            </a:extLst>
-          </p:cNvPr>
-          <p:cNvSpPr>
-            <a:spLocks noGrp="1"/>
-          </p:cNvSpPr>
-          <p:nvPr>
-            <p:ph type="title"/>
-          </p:nvPr>
-        </p:nvSpPr>
-        <p:spPr/>
-        <p:txBody>
-          <a:bodyPr/>
-          <a:lstStyle/>
-          <a:p>
-            <a:r>
-              <a:rPr lang="ko-KR" altLang="en-US" dirty="0"/>
-              <a:t>코드</a:t>
-            </a:r>
-          </a:p>
-        </p:txBody>
-      </p:sp>
-      <p:sp>
-        <p:nvSpPr>
-          <p:cNvPr id="3" name="내용 개체 틀 2">
-            <a:extLst>
-              <a:ext uri="{FF2B5EF4-FFF2-40B4-BE49-F238E27FC236}">
-                <a16:creationId xmlns:a16="http://schemas.microsoft.com/office/drawing/2014/main" id="{66F0132A-C4A2-477E-9EAA-8CB9A9378D12}"/>
-              </a:ext>
-            </a:extLst>
-          </p:cNvPr>
-          <p:cNvSpPr>
-            <a:spLocks noGrp="1"/>
-          </p:cNvSpPr>
-          <p:nvPr>
-            <p:ph idx="1"/>
-          </p:nvPr>
-        </p:nvSpPr>
-        <p:spPr/>
-        <p:txBody>
-          <a:bodyPr/>
-          <a:lstStyle/>
-          <a:p>
-            <a:r>
-              <a:rPr lang="en-US" altLang="ko-KR" dirty="0">
-                <a:hlinkClick r:id="rId2"/>
-              </a:rPr>
-              <a:t>https://github.com/seokjeongeum/algorithm-studies/blob/master/solution.cpp</a:t>
-            </a:r>
-            <a:endParaRPr lang="ko-KR" altLang="en-US" dirty="0"/>
-          </a:p>
-        </p:txBody>
-      </p:sp>
-    </p:spTree>
-    <p:extLst>
-      <p:ext uri="{BB962C8B-B14F-4D97-AF65-F5344CB8AC3E}">
-        <p14:creationId xmlns:p14="http://schemas.microsoft.com/office/powerpoint/2010/main" val="2891343329"/>
-      </p:ext>
-    </p:extLst>
-  </p:cSld>
-  <p:clrMapOvr>
-    <a:masterClrMapping/>
-  </p:clrMapOvr>
-</p:sld>
-</file>
-
-<file path=ppt/slides/slide7.xml><?xml version="1.0" encoding="utf-8"?>
-<p:sld xmlns:a="http://schemas.openxmlformats.org/drawingml/2006/main" xmlns:r="http://schemas.openxmlformats.org/officeDocument/2006/relationships" xmlns:p="http://schemas.openxmlformats.org/presentationml/2006/main">
-  <p:cSld>
-    <p:spTree>
-      <p:nvGrpSpPr>
-        <p:cNvPr id="1" name=""/>
-        <p:cNvGrpSpPr/>
-        <p:nvPr/>
-      </p:nvGrpSpPr>
-      <p:grpSpPr>
-        <a:xfrm>
-          <a:off x="0" y="0"/>
-          <a:ext cx="0" cy="0"/>
-          <a:chOff x="0" y="0"/>
-          <a:chExt cx="0" cy="0"/>
-        </a:xfrm>
-      </p:grpSpPr>
-      <p:sp>
-        <p:nvSpPr>
-          <p:cNvPr id="2" name="제목 1">
-            <a:extLst>
-              <a:ext uri="{FF2B5EF4-FFF2-40B4-BE49-F238E27FC236}">
                 <a16:creationId xmlns:a16="http://schemas.microsoft.com/office/drawing/2014/main" id="{52380D52-64C9-471F-A810-3CFDEFC905E1}"/>
               </a:ext>
             </a:extLst>
@@ -8399,6 +8196,95 @@
     <p:extLst>
       <p:ext uri="{BB962C8B-B14F-4D97-AF65-F5344CB8AC3E}">
         <p14:creationId xmlns:p14="http://schemas.microsoft.com/office/powerpoint/2010/main" val="326261702"/>
+      </p:ext>
+    </p:extLst>
+  </p:cSld>
+  <p:clrMapOvr>
+    <a:masterClrMapping/>
+  </p:clrMapOvr>
+</p:sld>
+</file>
+
+<file path=ppt/slides/slide7.xml><?xml version="1.0" encoding="utf-8"?>
+<p:sld xmlns:a="http://schemas.openxmlformats.org/drawingml/2006/main" xmlns:r="http://schemas.openxmlformats.org/officeDocument/2006/relationships" xmlns:p="http://schemas.openxmlformats.org/presentationml/2006/main">
+  <p:cSld>
+    <p:spTree>
+      <p:nvGrpSpPr>
+        <p:cNvPr id="1" name=""/>
+        <p:cNvGrpSpPr/>
+        <p:nvPr/>
+      </p:nvGrpSpPr>
+      <p:grpSpPr>
+        <a:xfrm>
+          <a:off x="0" y="0"/>
+          <a:ext cx="0" cy="0"/>
+          <a:chOff x="0" y="0"/>
+          <a:chExt cx="0" cy="0"/>
+        </a:xfrm>
+      </p:grpSpPr>
+      <p:sp>
+        <p:nvSpPr>
+          <p:cNvPr id="2" name="제목 1">
+            <a:extLst>
+              <a:ext uri="{FF2B5EF4-FFF2-40B4-BE49-F238E27FC236}">
+                <a16:creationId xmlns:a16="http://schemas.microsoft.com/office/drawing/2014/main" id="{6F81C93D-6C08-4117-94AC-4DFEFA943011}"/>
+              </a:ext>
+            </a:extLst>
+          </p:cNvPr>
+          <p:cNvSpPr>
+            <a:spLocks noGrp="1"/>
+          </p:cNvSpPr>
+          <p:nvPr>
+            <p:ph type="title"/>
+          </p:nvPr>
+        </p:nvSpPr>
+        <p:spPr/>
+        <p:txBody>
+          <a:bodyPr/>
+          <a:lstStyle/>
+          <a:p>
+            <a:r>
+              <a:rPr lang="ko-KR" altLang="en-US" dirty="0"/>
+              <a:t>코드</a:t>
+            </a:r>
+          </a:p>
+        </p:txBody>
+      </p:sp>
+      <p:sp>
+        <p:nvSpPr>
+          <p:cNvPr id="3" name="내용 개체 틀 2">
+            <a:extLst>
+              <a:ext uri="{FF2B5EF4-FFF2-40B4-BE49-F238E27FC236}">
+                <a16:creationId xmlns:a16="http://schemas.microsoft.com/office/drawing/2014/main" id="{66F0132A-C4A2-477E-9EAA-8CB9A9378D12}"/>
+              </a:ext>
+            </a:extLst>
+          </p:cNvPr>
+          <p:cNvSpPr>
+            <a:spLocks noGrp="1"/>
+          </p:cNvSpPr>
+          <p:nvPr>
+            <p:ph idx="1"/>
+          </p:nvPr>
+        </p:nvSpPr>
+        <p:spPr/>
+        <p:txBody>
+          <a:bodyPr/>
+          <a:lstStyle/>
+          <a:p>
+            <a:r>
+              <a:rPr lang="en-US" altLang="ko-KR" dirty="0">
+                <a:hlinkClick r:id="rId2"/>
+              </a:rPr>
+              <a:t>https://swexpertacademy.samsung.com/common/swea/solvingPractice/solveclub/solveclubProblemResult.do?contestProbId=AWz7zTnv13oAAAFw&amp;userSortingType=&amp;solveclubId=AWu23vqPNmAAAAFD&amp;attendYn=Y&amp;rowNum=10&amp;pageIndex=1</a:t>
+            </a:r>
+            <a:endParaRPr lang="en-US" altLang="ko-KR" dirty="0"/>
+          </a:p>
+        </p:txBody>
+      </p:sp>
+    </p:spTree>
+    <p:extLst>
+      <p:ext uri="{BB962C8B-B14F-4D97-AF65-F5344CB8AC3E}">
+        <p14:creationId xmlns:p14="http://schemas.microsoft.com/office/powerpoint/2010/main" val="2891343329"/>
       </p:ext>
     </p:extLst>
   </p:cSld>

</xml_diff>